<commit_message>
added cleaning notebook and added old notebooks to gitignore
</commit_message>
<xml_diff>
--- a/Part1_video.pptx
+++ b/Part1_video.pptx
@@ -8,10 +8,11 @@
     <p:sldId id="256" r:id="rId5"/>
     <p:sldId id="257" r:id="rId6"/>
     <p:sldId id="258" r:id="rId7"/>
-    <p:sldId id="261" r:id="rId8"/>
-    <p:sldId id="259" r:id="rId9"/>
-    <p:sldId id="260" r:id="rId10"/>
-    <p:sldId id="262" r:id="rId11"/>
+    <p:sldId id="263" r:id="rId8"/>
+    <p:sldId id="261" r:id="rId9"/>
+    <p:sldId id="259" r:id="rId10"/>
+    <p:sldId id="260" r:id="rId11"/>
+    <p:sldId id="262" r:id="rId12"/>
   </p:sldIdLst>
   <p:sldSz cx="12192000" cy="6858000"/>
   <p:notesSz cx="6858000" cy="9144000"/>
@@ -121,8 +122,11 @@
 <file path=ppt/revisionInfo.xml><?xml version="1.0" encoding="utf-8"?>
 <p1510:revInfo xmlns:a="http://schemas.openxmlformats.org/drawingml/2006/main" xmlns:r="http://schemas.openxmlformats.org/officeDocument/2006/relationships" xmlns:p1510="http://schemas.microsoft.com/office/powerpoint/2015/10/main">
   <p1510:revLst>
-    <p1510:client id="{51EE4435-C14D-A3CC-7508-DF148021A6EB}" v="2503" dt="2020-04-17T08:42:51.003"/>
-    <p1510:client id="{966BE9A6-813E-45E7-9B50-9B1167DF29B6}" v="310" dt="2020-04-17T08:44:49.453"/>
+    <p1510:client id="{3FC542D2-0866-495D-A1B5-696D2C03DF40}" v="84" dt="2020-04-17T12:02:23.581"/>
+    <p1510:client id="{50E199ED-0386-4BCB-A539-506C8881C8D4}" v="31" dt="2020-04-17T11:23:08.873"/>
+    <p1510:client id="{51EE4435-C14D-A3CC-7508-DF148021A6EB}" v="3687" dt="2020-04-17T11:55:09.226"/>
+    <p1510:client id="{75CD1F62-D0FA-330F-ECF1-F27F8E3D7176}" v="7" dt="2020-04-17T11:45:07.121"/>
+    <p1510:client id="{966BE9A6-813E-45E7-9B50-9B1167DF29B6}" v="406" dt="2020-04-17T12:48:41.651"/>
   </p1510:revLst>
 </p1510:revInfo>
 </file>
@@ -130,14 +134,153 @@
 <file path=ppt/changesInfos/changesInfo1.xml><?xml version="1.0" encoding="utf-8"?>
 <pc:chgInfo xmlns:a="http://schemas.openxmlformats.org/drawingml/2006/main" xmlns:r="http://schemas.openxmlformats.org/officeDocument/2006/relationships" xmlns:ac="http://schemas.microsoft.com/office/drawing/2013/main/command" xmlns:pc="http://schemas.microsoft.com/office/powerpoint/2013/main/command">
   <pc:docChgLst>
-    <pc:chgData name="Magnus Strandgaard" userId="dd26c189-253b-4b9c-9561-dd778468aff0" providerId="ADAL" clId="{966BE9A6-813E-45E7-9B50-9B1167DF29B6}"/>
-    <pc:docChg chg="custSel mod addSld modSld">
-      <pc:chgData name="Magnus Strandgaard" userId="dd26c189-253b-4b9c-9561-dd778468aff0" providerId="ADAL" clId="{966BE9A6-813E-45E7-9B50-9B1167DF29B6}" dt="2020-04-17T08:44:49.453" v="517" actId="20577"/>
+    <pc:chgData name="Anders Buch Thuesen" userId="82c33436-c3cd-4992-be55-3274ea198091" providerId="ADAL" clId="{3FC542D2-0866-495D-A1B5-696D2C03DF40}"/>
+    <pc:docChg chg="undo custSel modSld sldOrd">
+      <pc:chgData name="Anders Buch Thuesen" userId="82c33436-c3cd-4992-be55-3274ea198091" providerId="ADAL" clId="{3FC542D2-0866-495D-A1B5-696D2C03DF40}" dt="2020-04-17T12:02:23.579" v="82"/>
       <pc:docMkLst>
         <pc:docMk/>
       </pc:docMkLst>
-      <pc:sldChg chg="addSp modSp mod setBg">
-        <pc:chgData name="Magnus Strandgaard" userId="dd26c189-253b-4b9c-9561-dd778468aff0" providerId="ADAL" clId="{966BE9A6-813E-45E7-9B50-9B1167DF29B6}" dt="2020-04-17T08:23:18.485" v="215" actId="20577"/>
+      <pc:sldChg chg="modSp">
+        <pc:chgData name="Anders Buch Thuesen" userId="82c33436-c3cd-4992-be55-3274ea198091" providerId="ADAL" clId="{3FC542D2-0866-495D-A1B5-696D2C03DF40}" dt="2020-04-17T11:30:41.514" v="61" actId="5793"/>
+        <pc:sldMkLst>
+          <pc:docMk/>
+          <pc:sldMk cId="3996652324" sldId="257"/>
+        </pc:sldMkLst>
+        <pc:spChg chg="mod">
+          <ac:chgData name="Anders Buch Thuesen" userId="82c33436-c3cd-4992-be55-3274ea198091" providerId="ADAL" clId="{3FC542D2-0866-495D-A1B5-696D2C03DF40}" dt="2020-04-17T11:30:41.514" v="61" actId="5793"/>
+          <ac:spMkLst>
+            <pc:docMk/>
+            <pc:sldMk cId="3996652324" sldId="257"/>
+            <ac:spMk id="3" creationId="{73890C20-57DE-473E-84F9-07EBCEE19E3E}"/>
+          </ac:spMkLst>
+        </pc:spChg>
+      </pc:sldChg>
+      <pc:sldChg chg="modSp">
+        <pc:chgData name="Anders Buch Thuesen" userId="82c33436-c3cd-4992-be55-3274ea198091" providerId="ADAL" clId="{3FC542D2-0866-495D-A1B5-696D2C03DF40}" dt="2020-04-17T11:59:38.375" v="65" actId="5793"/>
+        <pc:sldMkLst>
+          <pc:docMk/>
+          <pc:sldMk cId="2012200486" sldId="259"/>
+        </pc:sldMkLst>
+        <pc:spChg chg="mod">
+          <ac:chgData name="Anders Buch Thuesen" userId="82c33436-c3cd-4992-be55-3274ea198091" providerId="ADAL" clId="{3FC542D2-0866-495D-A1B5-696D2C03DF40}" dt="2020-04-17T11:59:38.375" v="65" actId="5793"/>
+          <ac:spMkLst>
+            <pc:docMk/>
+            <pc:sldMk cId="2012200486" sldId="259"/>
+            <ac:spMk id="3" creationId="{665EF008-76E9-4D2A-8EE2-DB24119E3945}"/>
+          </ac:spMkLst>
+        </pc:spChg>
+      </pc:sldChg>
+      <pc:sldChg chg="modSp">
+        <pc:chgData name="Anders Buch Thuesen" userId="82c33436-c3cd-4992-be55-3274ea198091" providerId="ADAL" clId="{3FC542D2-0866-495D-A1B5-696D2C03DF40}" dt="2020-04-17T12:00:46.302" v="81" actId="27636"/>
+        <pc:sldMkLst>
+          <pc:docMk/>
+          <pc:sldMk cId="1118705643" sldId="260"/>
+        </pc:sldMkLst>
+        <pc:spChg chg="mod">
+          <ac:chgData name="Anders Buch Thuesen" userId="82c33436-c3cd-4992-be55-3274ea198091" providerId="ADAL" clId="{3FC542D2-0866-495D-A1B5-696D2C03DF40}" dt="2020-04-17T12:00:46.302" v="81" actId="27636"/>
+          <ac:spMkLst>
+            <pc:docMk/>
+            <pc:sldMk cId="1118705643" sldId="260"/>
+            <ac:spMk id="3" creationId="{F9454412-4F10-4625-BF86-F1A1ED6E3C7B}"/>
+          </ac:spMkLst>
+        </pc:spChg>
+      </pc:sldChg>
+      <pc:sldChg chg="addSp delSp modSp delAnim">
+        <pc:chgData name="Anders Buch Thuesen" userId="82c33436-c3cd-4992-be55-3274ea198091" providerId="ADAL" clId="{3FC542D2-0866-495D-A1B5-696D2C03DF40}" dt="2020-04-17T11:28:36.631" v="55" actId="478"/>
+        <pc:sldMkLst>
+          <pc:docMk/>
+          <pc:sldMk cId="3523726295" sldId="261"/>
+        </pc:sldMkLst>
+        <pc:spChg chg="mod">
+          <ac:chgData name="Anders Buch Thuesen" userId="82c33436-c3cd-4992-be55-3274ea198091" providerId="ADAL" clId="{3FC542D2-0866-495D-A1B5-696D2C03DF40}" dt="2020-04-17T11:27:29.708" v="53" actId="20577"/>
+          <ac:spMkLst>
+            <pc:docMk/>
+            <pc:sldMk cId="3523726295" sldId="261"/>
+            <ac:spMk id="2" creationId="{8ED910BA-BF28-4119-88F5-79F3A90B0F53}"/>
+          </ac:spMkLst>
+        </pc:spChg>
+        <pc:spChg chg="mod">
+          <ac:chgData name="Anders Buch Thuesen" userId="82c33436-c3cd-4992-be55-3274ea198091" providerId="ADAL" clId="{3FC542D2-0866-495D-A1B5-696D2C03DF40}" dt="2020-04-17T11:27:28.987" v="51" actId="20577"/>
+          <ac:spMkLst>
+            <pc:docMk/>
+            <pc:sldMk cId="3523726295" sldId="261"/>
+            <ac:spMk id="3" creationId="{2DE5A1ED-C76F-48E8-95F2-AC1BA42EA691}"/>
+          </ac:spMkLst>
+        </pc:spChg>
+        <pc:picChg chg="add del mod">
+          <ac:chgData name="Anders Buch Thuesen" userId="82c33436-c3cd-4992-be55-3274ea198091" providerId="ADAL" clId="{3FC542D2-0866-495D-A1B5-696D2C03DF40}" dt="2020-04-17T11:28:36.631" v="55" actId="478"/>
+          <ac:picMkLst>
+            <pc:docMk/>
+            <pc:sldMk cId="3523726295" sldId="261"/>
+            <ac:picMk id="4" creationId="{BC40EA63-22E3-4BF4-8810-FD0D4B8B8529}"/>
+          </ac:picMkLst>
+        </pc:picChg>
+      </pc:sldChg>
+      <pc:sldChg chg="addSp modSp ord">
+        <pc:chgData name="Anders Buch Thuesen" userId="82c33436-c3cd-4992-be55-3274ea198091" providerId="ADAL" clId="{3FC542D2-0866-495D-A1B5-696D2C03DF40}" dt="2020-04-17T12:02:23.579" v="82"/>
+        <pc:sldMkLst>
+          <pc:docMk/>
+          <pc:sldMk cId="1497326156" sldId="263"/>
+        </pc:sldMkLst>
+        <pc:picChg chg="add mod">
+          <ac:chgData name="Anders Buch Thuesen" userId="82c33436-c3cd-4992-be55-3274ea198091" providerId="ADAL" clId="{3FC542D2-0866-495D-A1B5-696D2C03DF40}" dt="2020-04-17T11:45:33.033" v="63" actId="26606"/>
+          <ac:picMkLst>
+            <pc:docMk/>
+            <pc:sldMk cId="1497326156" sldId="263"/>
+            <ac:picMk id="4" creationId="{81C80496-E692-47FC-A8CB-8477B635CFD4}"/>
+          </ac:picMkLst>
+        </pc:picChg>
+      </pc:sldChg>
+    </pc:docChg>
+  </pc:docChgLst>
+  <pc:docChgLst>
+    <pc:chgData name="Anders Buch Thuesen" userId="S::s153242@win.dtu.dk::82c33436-c3cd-4992-be55-3274ea198091" providerId="AD" clId="Web-{75CD1F62-D0FA-330F-ECF1-F27F8E3D7176}"/>
+    <pc:docChg chg="addSld modSld">
+      <pc:chgData name="Anders Buch Thuesen" userId="S::s153242@win.dtu.dk::82c33436-c3cd-4992-be55-3274ea198091" providerId="AD" clId="Web-{75CD1F62-D0FA-330F-ECF1-F27F8E3D7176}" dt="2020-04-17T11:45:07.121" v="7"/>
+      <pc:docMkLst>
+        <pc:docMk/>
+      </pc:docMkLst>
+      <pc:sldChg chg="addSp delSp modSp">
+        <pc:chgData name="Anders Buch Thuesen" userId="S::s153242@win.dtu.dk::82c33436-c3cd-4992-be55-3274ea198091" providerId="AD" clId="Web-{75CD1F62-D0FA-330F-ECF1-F27F8E3D7176}" dt="2020-04-17T11:44:25.418" v="2"/>
+        <pc:sldMkLst>
+          <pc:docMk/>
+          <pc:sldMk cId="2858713629" sldId="258"/>
+        </pc:sldMkLst>
+        <pc:picChg chg="add del mod">
+          <ac:chgData name="Anders Buch Thuesen" userId="S::s153242@win.dtu.dk::82c33436-c3cd-4992-be55-3274ea198091" providerId="AD" clId="Web-{75CD1F62-D0FA-330F-ECF1-F27F8E3D7176}" dt="2020-04-17T11:44:25.418" v="2"/>
+          <ac:picMkLst>
+            <pc:docMk/>
+            <pc:sldMk cId="2858713629" sldId="258"/>
+            <ac:picMk id="4" creationId="{1A946D4F-A771-4FB9-89BA-60A41624B23A}"/>
+          </ac:picMkLst>
+        </pc:picChg>
+      </pc:sldChg>
+      <pc:sldChg chg="addSp delSp modSp new mod setBg">
+        <pc:chgData name="Anders Buch Thuesen" userId="S::s153242@win.dtu.dk::82c33436-c3cd-4992-be55-3274ea198091" providerId="AD" clId="Web-{75CD1F62-D0FA-330F-ECF1-F27F8E3D7176}" dt="2020-04-17T11:45:07.121" v="7"/>
+        <pc:sldMkLst>
+          <pc:docMk/>
+          <pc:sldMk cId="1497326156" sldId="263"/>
+        </pc:sldMkLst>
+        <pc:picChg chg="add del mod">
+          <ac:chgData name="Anders Buch Thuesen" userId="S::s153242@win.dtu.dk::82c33436-c3cd-4992-be55-3274ea198091" providerId="AD" clId="Web-{75CD1F62-D0FA-330F-ECF1-F27F8E3D7176}" dt="2020-04-17T11:45:07.121" v="7"/>
+          <ac:picMkLst>
+            <pc:docMk/>
+            <pc:sldMk cId="1497326156" sldId="263"/>
+            <ac:picMk id="2" creationId="{26E76E23-EAB8-4286-8EB9-326948E87451}"/>
+          </ac:picMkLst>
+        </pc:picChg>
+      </pc:sldChg>
+    </pc:docChg>
+  </pc:docChgLst>
+  <pc:docChgLst>
+    <pc:chgData name="Magnus Strandgaard" userId="dd26c189-253b-4b9c-9561-dd778468aff0" providerId="ADAL" clId="{966BE9A6-813E-45E7-9B50-9B1167DF29B6}"/>
+    <pc:docChg chg="custSel mod addSld modSld">
+      <pc:chgData name="Magnus Strandgaard" userId="dd26c189-253b-4b9c-9561-dd778468aff0" providerId="ADAL" clId="{966BE9A6-813E-45E7-9B50-9B1167DF29B6}" dt="2020-04-17T12:48:41.652" v="613" actId="14100"/>
+      <pc:docMkLst>
+        <pc:docMk/>
+      </pc:docMkLst>
+      <pc:sldChg chg="addSp delSp modSp mod modTransition setBg delAnim modAnim">
+        <pc:chgData name="Magnus Strandgaard" userId="dd26c189-253b-4b9c-9561-dd778468aff0" providerId="ADAL" clId="{966BE9A6-813E-45E7-9B50-9B1167DF29B6}" dt="2020-04-17T11:28:48.014" v="523" actId="478"/>
         <pc:sldMkLst>
           <pc:docMk/>
           <pc:sldMk cId="4111015336" sldId="256"/>
@@ -190,9 +333,33 @@
             <ac:picMk id="5" creationId="{8E7DE666-8F73-479A-9FE9-6A0CD731CEBF}"/>
           </ac:picMkLst>
         </pc:picChg>
+        <pc:picChg chg="add del mod">
+          <ac:chgData name="Magnus Strandgaard" userId="dd26c189-253b-4b9c-9561-dd778468aff0" providerId="ADAL" clId="{966BE9A6-813E-45E7-9B50-9B1167DF29B6}" dt="2020-04-17T11:24:18.795" v="519"/>
+          <ac:picMkLst>
+            <pc:docMk/>
+            <pc:sldMk cId="4111015336" sldId="256"/>
+            <ac:picMk id="6" creationId="{61381662-924A-43E8-8A94-9787FA3BC488}"/>
+          </ac:picMkLst>
+        </pc:picChg>
+        <pc:picChg chg="add del mod">
+          <ac:chgData name="Magnus Strandgaard" userId="dd26c189-253b-4b9c-9561-dd778468aff0" providerId="ADAL" clId="{966BE9A6-813E-45E7-9B50-9B1167DF29B6}" dt="2020-04-17T11:24:27.399" v="520"/>
+          <ac:picMkLst>
+            <pc:docMk/>
+            <pc:sldMk cId="4111015336" sldId="256"/>
+            <ac:picMk id="7" creationId="{773D5C7A-E4A1-4121-9DCB-9B8C405CCDDC}"/>
+          </ac:picMkLst>
+        </pc:picChg>
+        <pc:picChg chg="add del mod">
+          <ac:chgData name="Magnus Strandgaard" userId="dd26c189-253b-4b9c-9561-dd778468aff0" providerId="ADAL" clId="{966BE9A6-813E-45E7-9B50-9B1167DF29B6}" dt="2020-04-17T11:28:48.014" v="523" actId="478"/>
+          <ac:picMkLst>
+            <pc:docMk/>
+            <pc:sldMk cId="4111015336" sldId="256"/>
+            <ac:picMk id="8" creationId="{4669F30D-2799-4702-812E-B3938FC5EBF9}"/>
+          </ac:picMkLst>
+        </pc:picChg>
       </pc:sldChg>
-      <pc:sldChg chg="addSp delSp modSp add">
-        <pc:chgData name="Magnus Strandgaard" userId="dd26c189-253b-4b9c-9561-dd778468aff0" providerId="ADAL" clId="{966BE9A6-813E-45E7-9B50-9B1167DF29B6}" dt="2020-04-16T11:19:15.210" v="146" actId="1076"/>
+      <pc:sldChg chg="addSp delSp modSp add modTransition delAnim modAnim">
+        <pc:chgData name="Magnus Strandgaard" userId="dd26c189-253b-4b9c-9561-dd778468aff0" providerId="ADAL" clId="{966BE9A6-813E-45E7-9B50-9B1167DF29B6}" dt="2020-04-17T12:48:28.208" v="611" actId="1076"/>
         <pc:sldMkLst>
           <pc:docMk/>
           <pc:sldMk cId="3996652324" sldId="257"/>
@@ -214,16 +381,32 @@
           </ac:spMkLst>
         </pc:spChg>
         <pc:picChg chg="add mod">
-          <ac:chgData name="Magnus Strandgaard" userId="dd26c189-253b-4b9c-9561-dd778468aff0" providerId="ADAL" clId="{966BE9A6-813E-45E7-9B50-9B1167DF29B6}" dt="2020-04-16T11:19:15.210" v="146" actId="1076"/>
+          <ac:chgData name="Magnus Strandgaard" userId="dd26c189-253b-4b9c-9561-dd778468aff0" providerId="ADAL" clId="{966BE9A6-813E-45E7-9B50-9B1167DF29B6}" dt="2020-04-17T12:48:28.208" v="611" actId="1076"/>
           <ac:picMkLst>
             <pc:docMk/>
             <pc:sldMk cId="3996652324" sldId="257"/>
             <ac:picMk id="5" creationId="{56CBE6F1-6CFE-45E9-893A-A7EED119C622}"/>
           </ac:picMkLst>
         </pc:picChg>
+        <pc:picChg chg="add del mod">
+          <ac:chgData name="Magnus Strandgaard" userId="dd26c189-253b-4b9c-9561-dd778468aff0" providerId="ADAL" clId="{966BE9A6-813E-45E7-9B50-9B1167DF29B6}" dt="2020-04-17T11:24:27.399" v="520"/>
+          <ac:picMkLst>
+            <pc:docMk/>
+            <pc:sldMk cId="3996652324" sldId="257"/>
+            <ac:picMk id="6" creationId="{BF54801D-5D26-4E64-A9CC-BE96BBCEAB78}"/>
+          </ac:picMkLst>
+        </pc:picChg>
+        <pc:picChg chg="add del mod">
+          <ac:chgData name="Magnus Strandgaard" userId="dd26c189-253b-4b9c-9561-dd778468aff0" providerId="ADAL" clId="{966BE9A6-813E-45E7-9B50-9B1167DF29B6}" dt="2020-04-17T11:28:44.586" v="522" actId="478"/>
+          <ac:picMkLst>
+            <pc:docMk/>
+            <pc:sldMk cId="3996652324" sldId="257"/>
+            <ac:picMk id="7" creationId="{487E938B-4C60-4EBE-8C94-D53348A17E82}"/>
+          </ac:picMkLst>
+        </pc:picChg>
       </pc:sldChg>
-      <pc:sldChg chg="modSp add">
-        <pc:chgData name="Magnus Strandgaard" userId="dd26c189-253b-4b9c-9561-dd778468aff0" providerId="ADAL" clId="{966BE9A6-813E-45E7-9B50-9B1167DF29B6}" dt="2020-04-17T08:30:22.776" v="235" actId="20577"/>
+      <pc:sldChg chg="addSp delSp modSp add modTransition delAnim modAnim">
+        <pc:chgData name="Magnus Strandgaard" userId="dd26c189-253b-4b9c-9561-dd778468aff0" providerId="ADAL" clId="{966BE9A6-813E-45E7-9B50-9B1167DF29B6}" dt="2020-04-17T12:48:41.652" v="613" actId="14100"/>
         <pc:sldMkLst>
           <pc:docMk/>
           <pc:sldMk cId="2858713629" sldId="258"/>
@@ -236,9 +419,33 @@
             <ac:spMk id="2" creationId="{588ECA33-D482-47F4-BBF9-1C2BF97E14EF}"/>
           </ac:spMkLst>
         </pc:spChg>
+        <pc:spChg chg="mod">
+          <ac:chgData name="Magnus Strandgaard" userId="dd26c189-253b-4b9c-9561-dd778468aff0" providerId="ADAL" clId="{966BE9A6-813E-45E7-9B50-9B1167DF29B6}" dt="2020-04-17T12:48:41.652" v="613" actId="14100"/>
+          <ac:spMkLst>
+            <pc:docMk/>
+            <pc:sldMk cId="2858713629" sldId="258"/>
+            <ac:spMk id="3" creationId="{352626D0-4E79-42C6-BAE3-922C429AE417}"/>
+          </ac:spMkLst>
+        </pc:spChg>
+        <pc:picChg chg="add del mod">
+          <ac:chgData name="Magnus Strandgaard" userId="dd26c189-253b-4b9c-9561-dd778468aff0" providerId="ADAL" clId="{966BE9A6-813E-45E7-9B50-9B1167DF29B6}" dt="2020-04-17T11:24:27.399" v="520"/>
+          <ac:picMkLst>
+            <pc:docMk/>
+            <pc:sldMk cId="2858713629" sldId="258"/>
+            <ac:picMk id="4" creationId="{15A6D733-4329-4F18-9CA1-BD26173E25A4}"/>
+          </ac:picMkLst>
+        </pc:picChg>
+        <pc:picChg chg="add del mod">
+          <ac:chgData name="Magnus Strandgaard" userId="dd26c189-253b-4b9c-9561-dd778468aff0" providerId="ADAL" clId="{966BE9A6-813E-45E7-9B50-9B1167DF29B6}" dt="2020-04-17T11:28:50.515" v="524" actId="478"/>
+          <ac:picMkLst>
+            <pc:docMk/>
+            <pc:sldMk cId="2858713629" sldId="258"/>
+            <ac:picMk id="5" creationId="{CF3B696B-16F9-452A-97E0-9FB6AEB51852}"/>
+          </ac:picMkLst>
+        </pc:picChg>
       </pc:sldChg>
-      <pc:sldChg chg="modSp add">
-        <pc:chgData name="Magnus Strandgaard" userId="dd26c189-253b-4b9c-9561-dd778468aff0" providerId="ADAL" clId="{966BE9A6-813E-45E7-9B50-9B1167DF29B6}" dt="2020-04-17T08:40:48.201" v="291" actId="20577"/>
+      <pc:sldChg chg="addSp delSp modSp add modTransition modAnim">
+        <pc:chgData name="Magnus Strandgaard" userId="dd26c189-253b-4b9c-9561-dd778468aff0" providerId="ADAL" clId="{966BE9A6-813E-45E7-9B50-9B1167DF29B6}" dt="2020-04-17T11:59:57.307" v="610" actId="20577"/>
         <pc:sldMkLst>
           <pc:docMk/>
           <pc:sldMk cId="2012200486" sldId="259"/>
@@ -252,16 +459,24 @@
           </ac:spMkLst>
         </pc:spChg>
         <pc:spChg chg="mod">
-          <ac:chgData name="Magnus Strandgaard" userId="dd26c189-253b-4b9c-9561-dd778468aff0" providerId="ADAL" clId="{966BE9A6-813E-45E7-9B50-9B1167DF29B6}" dt="2020-04-17T08:40:48.201" v="291" actId="20577"/>
+          <ac:chgData name="Magnus Strandgaard" userId="dd26c189-253b-4b9c-9561-dd778468aff0" providerId="ADAL" clId="{966BE9A6-813E-45E7-9B50-9B1167DF29B6}" dt="2020-04-17T11:59:57.307" v="610" actId="20577"/>
           <ac:spMkLst>
             <pc:docMk/>
             <pc:sldMk cId="2012200486" sldId="259"/>
             <ac:spMk id="3" creationId="{665EF008-76E9-4D2A-8EE2-DB24119E3945}"/>
           </ac:spMkLst>
         </pc:spChg>
+        <pc:picChg chg="add del mod">
+          <ac:chgData name="Magnus Strandgaard" userId="dd26c189-253b-4b9c-9561-dd778468aff0" providerId="ADAL" clId="{966BE9A6-813E-45E7-9B50-9B1167DF29B6}" dt="2020-04-17T11:24:27.399" v="520"/>
+          <ac:picMkLst>
+            <pc:docMk/>
+            <pc:sldMk cId="2012200486" sldId="259"/>
+            <ac:picMk id="4" creationId="{619AFE6D-31AF-4CAC-A229-E22260D7EEF9}"/>
+          </ac:picMkLst>
+        </pc:picChg>
       </pc:sldChg>
-      <pc:sldChg chg="modSp add">
-        <pc:chgData name="Magnus Strandgaard" userId="dd26c189-253b-4b9c-9561-dd778468aff0" providerId="ADAL" clId="{966BE9A6-813E-45E7-9B50-9B1167DF29B6}" dt="2020-04-17T08:44:12.650" v="499" actId="20577"/>
+      <pc:sldChg chg="addSp delSp modSp add modTransition modAnim">
+        <pc:chgData name="Magnus Strandgaard" userId="dd26c189-253b-4b9c-9561-dd778468aff0" providerId="ADAL" clId="{966BE9A6-813E-45E7-9B50-9B1167DF29B6}" dt="2020-04-17T11:57:46.104" v="586" actId="20577"/>
         <pc:sldMkLst>
           <pc:docMk/>
           <pc:sldMk cId="1118705643" sldId="260"/>
@@ -275,16 +490,24 @@
           </ac:spMkLst>
         </pc:spChg>
         <pc:spChg chg="mod">
-          <ac:chgData name="Magnus Strandgaard" userId="dd26c189-253b-4b9c-9561-dd778468aff0" providerId="ADAL" clId="{966BE9A6-813E-45E7-9B50-9B1167DF29B6}" dt="2020-04-17T08:44:12.650" v="499" actId="20577"/>
+          <ac:chgData name="Magnus Strandgaard" userId="dd26c189-253b-4b9c-9561-dd778468aff0" providerId="ADAL" clId="{966BE9A6-813E-45E7-9B50-9B1167DF29B6}" dt="2020-04-17T11:57:46.104" v="586" actId="20577"/>
           <ac:spMkLst>
             <pc:docMk/>
             <pc:sldMk cId="1118705643" sldId="260"/>
             <ac:spMk id="3" creationId="{F9454412-4F10-4625-BF86-F1A1ED6E3C7B}"/>
           </ac:spMkLst>
         </pc:spChg>
+        <pc:picChg chg="add del mod">
+          <ac:chgData name="Magnus Strandgaard" userId="dd26c189-253b-4b9c-9561-dd778468aff0" providerId="ADAL" clId="{966BE9A6-813E-45E7-9B50-9B1167DF29B6}" dt="2020-04-17T11:24:27.399" v="520"/>
+          <ac:picMkLst>
+            <pc:docMk/>
+            <pc:sldMk cId="1118705643" sldId="260"/>
+            <ac:picMk id="4" creationId="{42BA4879-3828-41F5-A0D6-1BD2BE010F09}"/>
+          </ac:picMkLst>
+        </pc:picChg>
       </pc:sldChg>
-      <pc:sldChg chg="modSp add">
-        <pc:chgData name="Magnus Strandgaard" userId="dd26c189-253b-4b9c-9561-dd778468aff0" providerId="ADAL" clId="{966BE9A6-813E-45E7-9B50-9B1167DF29B6}" dt="2020-04-17T08:35:59.286" v="265" actId="20577"/>
+      <pc:sldChg chg="addSp delSp modSp add modTransition modAnim">
+        <pc:chgData name="Magnus Strandgaard" userId="dd26c189-253b-4b9c-9561-dd778468aff0" providerId="ADAL" clId="{966BE9A6-813E-45E7-9B50-9B1167DF29B6}" dt="2020-04-17T11:24:27.399" v="520"/>
         <pc:sldMkLst>
           <pc:docMk/>
           <pc:sldMk cId="3523726295" sldId="261"/>
@@ -297,9 +520,17 @@
             <ac:spMk id="3" creationId="{2DE5A1ED-C76F-48E8-95F2-AC1BA42EA691}"/>
           </ac:spMkLst>
         </pc:spChg>
+        <pc:picChg chg="add del mod">
+          <ac:chgData name="Magnus Strandgaard" userId="dd26c189-253b-4b9c-9561-dd778468aff0" providerId="ADAL" clId="{966BE9A6-813E-45E7-9B50-9B1167DF29B6}" dt="2020-04-17T11:24:27.399" v="520"/>
+          <ac:picMkLst>
+            <pc:docMk/>
+            <pc:sldMk cId="3523726295" sldId="261"/>
+            <ac:picMk id="4" creationId="{6BA82CA6-62B8-47BE-B0AD-8FF2894A6C49}"/>
+          </ac:picMkLst>
+        </pc:picChg>
       </pc:sldChg>
-      <pc:sldChg chg="modSp add">
-        <pc:chgData name="Magnus Strandgaard" userId="dd26c189-253b-4b9c-9561-dd778468aff0" providerId="ADAL" clId="{966BE9A6-813E-45E7-9B50-9B1167DF29B6}" dt="2020-04-17T08:44:49.453" v="517" actId="20577"/>
+      <pc:sldChg chg="addSp delSp modSp add modTransition modAnim">
+        <pc:chgData name="Magnus Strandgaard" userId="dd26c189-253b-4b9c-9561-dd778468aff0" providerId="ADAL" clId="{966BE9A6-813E-45E7-9B50-9B1167DF29B6}" dt="2020-04-17T11:24:27.399" v="520"/>
         <pc:sldMkLst>
           <pc:docMk/>
           <pc:sldMk cId="2719062385" sldId="262"/>
@@ -312,24 +543,64 @@
             <ac:spMk id="2" creationId="{6D1EB3EE-F3CB-464E-BD0B-CC94BB67F125}"/>
           </ac:spMkLst>
         </pc:spChg>
+        <pc:picChg chg="add del mod">
+          <ac:chgData name="Magnus Strandgaard" userId="dd26c189-253b-4b9c-9561-dd778468aff0" providerId="ADAL" clId="{966BE9A6-813E-45E7-9B50-9B1167DF29B6}" dt="2020-04-17T11:24:27.399" v="520"/>
+          <ac:picMkLst>
+            <pc:docMk/>
+            <pc:sldMk cId="2719062385" sldId="262"/>
+            <ac:picMk id="4" creationId="{7A8548BC-EF9B-41B2-998D-3435DA7B9DE2}"/>
+          </ac:picMkLst>
+        </pc:picChg>
+      </pc:sldChg>
+    </pc:docChg>
+  </pc:docChgLst>
+  <pc:docChgLst>
+    <pc:chgData name="Anders Buch Thuesen" userId="S::s153242@win.dtu.dk::82c33436-c3cd-4992-be55-3274ea198091" providerId="AD" clId="Web-{50E199ED-0386-4BCB-A539-506C8881C8D4}"/>
+    <pc:docChg chg="modSld">
+      <pc:chgData name="Anders Buch Thuesen" userId="S::s153242@win.dtu.dk::82c33436-c3cd-4992-be55-3274ea198091" providerId="AD" clId="Web-{50E199ED-0386-4BCB-A539-506C8881C8D4}" dt="2020-04-17T11:23:08.873" v="29" actId="1076"/>
+      <pc:docMkLst>
+        <pc:docMk/>
+      </pc:docMkLst>
+      <pc:sldChg chg="modSp">
+        <pc:chgData name="Anders Buch Thuesen" userId="S::s153242@win.dtu.dk::82c33436-c3cd-4992-be55-3274ea198091" providerId="AD" clId="Web-{50E199ED-0386-4BCB-A539-506C8881C8D4}" dt="2020-04-17T11:23:08.873" v="29" actId="1076"/>
+        <pc:sldMkLst>
+          <pc:docMk/>
+          <pc:sldMk cId="2858713629" sldId="258"/>
+        </pc:sldMkLst>
+        <pc:spChg chg="mod">
+          <ac:chgData name="Anders Buch Thuesen" userId="S::s153242@win.dtu.dk::82c33436-c3cd-4992-be55-3274ea198091" providerId="AD" clId="Web-{50E199ED-0386-4BCB-A539-506C8881C8D4}" dt="2020-04-17T11:23:08.873" v="29" actId="1076"/>
+          <ac:spMkLst>
+            <pc:docMk/>
+            <pc:sldMk cId="2858713629" sldId="258"/>
+            <ac:spMk id="2" creationId="{588ECA33-D482-47F4-BBF9-1C2BF97E14EF}"/>
+          </ac:spMkLst>
+        </pc:spChg>
+        <pc:spChg chg="mod">
+          <ac:chgData name="Anders Buch Thuesen" userId="S::s153242@win.dtu.dk::82c33436-c3cd-4992-be55-3274ea198091" providerId="AD" clId="Web-{50E199ED-0386-4BCB-A539-506C8881C8D4}" dt="2020-04-17T11:19:06.277" v="26" actId="20577"/>
+          <ac:spMkLst>
+            <pc:docMk/>
+            <pc:sldMk cId="2858713629" sldId="258"/>
+            <ac:spMk id="3" creationId="{352626D0-4E79-42C6-BAE3-922C429AE417}"/>
+          </ac:spMkLst>
+        </pc:spChg>
       </pc:sldChg>
     </pc:docChg>
   </pc:docChgLst>
   <pc:docChgLst>
     <pc:chgData name="anderssiigdreisig@gmail.com" userId="S::urn:spo:guest#anderssiigdreisig@gmail.com::" providerId="AD" clId="Web-{51EE4435-C14D-A3CC-7508-DF148021A6EB}"/>
-    <pc:docChg chg="modSld">
-      <pc:chgData name="anderssiigdreisig@gmail.com" userId="S::urn:spo:guest#anderssiigdreisig@gmail.com::" providerId="AD" clId="Web-{51EE4435-C14D-A3CC-7508-DF148021A6EB}" dt="2020-04-17T08:42:51.003" v="2502" actId="20577"/>
+    <pc:docChg chg="modSld sldOrd">
+      <pc:chgData name="anderssiigdreisig@gmail.com" userId="S::urn:spo:guest#anderssiigdreisig@gmail.com::" providerId="AD" clId="Web-{51EE4435-C14D-A3CC-7508-DF148021A6EB}" dt="2020-04-17T11:55:09.226" v="3686" actId="20577"/>
       <pc:docMkLst>
         <pc:docMk/>
       </pc:docMkLst>
       <pc:sldChg chg="addSp modSp">
-        <pc:chgData name="anderssiigdreisig@gmail.com" userId="S::urn:spo:guest#anderssiigdreisig@gmail.com::" providerId="AD" clId="Web-{51EE4435-C14D-A3CC-7508-DF148021A6EB}" dt="2020-04-17T08:33:52.316" v="1217" actId="20577"/>
+        <pc:chgData name="anderssiigdreisig@gmail.com" userId="S::urn:spo:guest#anderssiigdreisig@gmail.com::" providerId="AD" clId="Web-{51EE4435-C14D-A3CC-7508-DF148021A6EB}" dt="2020-04-17T11:37:43.377" v="2621" actId="20577"/>
         <pc:sldMkLst>
           <pc:docMk/>
           <pc:sldMk cId="3996652324" sldId="257"/>
         </pc:sldMkLst>
         <pc:spChg chg="add mod">
-          <ac:chgData name="anderssiigdreisig@gmail.com" userId="S::urn:spo:guest#anderssiigdreisig@gmail.com::" providerId="AD" clId="Web-{51EE4435-C14D-A3CC-7508-DF148021A6EB}" dt="2020-04-17T08:33:52.316" v="1217" actId="20577"/>
+          <ac:chgData name="anderssiigdreisig@gmail.com" userId="S::urn:spo:guest#anderssiigdreisig@gmail.com::" providerId="AD" clId="Web-{51EE4435-C14D-A3CC-7508-DF148021A6EB}" dt="2020-04-17T11:37:43.377" v="2621" actId="20577"/>
           <ac:spMkLst>
             <pc:docMk/>
             <pc:sldMk cId="3996652324" sldId="257"/>
@@ -338,13 +609,13 @@
         </pc:spChg>
       </pc:sldChg>
       <pc:sldChg chg="modSp">
-        <pc:chgData name="anderssiigdreisig@gmail.com" userId="S::urn:spo:guest#anderssiigdreisig@gmail.com::" providerId="AD" clId="Web-{51EE4435-C14D-A3CC-7508-DF148021A6EB}" dt="2020-04-17T08:40:36.304" v="2273" actId="20577"/>
+        <pc:chgData name="anderssiigdreisig@gmail.com" userId="S::urn:spo:guest#anderssiigdreisig@gmail.com::" providerId="AD" clId="Web-{51EE4435-C14D-A3CC-7508-DF148021A6EB}" dt="2020-04-17T11:41:19.700" v="2650" actId="20577"/>
         <pc:sldMkLst>
           <pc:docMk/>
           <pc:sldMk cId="2858713629" sldId="258"/>
         </pc:sldMkLst>
         <pc:spChg chg="mod">
-          <ac:chgData name="anderssiigdreisig@gmail.com" userId="S::urn:spo:guest#anderssiigdreisig@gmail.com::" providerId="AD" clId="Web-{51EE4435-C14D-A3CC-7508-DF148021A6EB}" dt="2020-04-17T08:40:36.304" v="2273" actId="20577"/>
+          <ac:chgData name="anderssiigdreisig@gmail.com" userId="S::urn:spo:guest#anderssiigdreisig@gmail.com::" providerId="AD" clId="Web-{51EE4435-C14D-A3CC-7508-DF148021A6EB}" dt="2020-04-17T11:41:19.700" v="2650" actId="20577"/>
           <ac:spMkLst>
             <pc:docMk/>
             <pc:sldMk cId="2858713629" sldId="258"/>
@@ -353,13 +624,13 @@
         </pc:spChg>
       </pc:sldChg>
       <pc:sldChg chg="modSp">
-        <pc:chgData name="anderssiigdreisig@gmail.com" userId="S::urn:spo:guest#anderssiigdreisig@gmail.com::" providerId="AD" clId="Web-{51EE4435-C14D-A3CC-7508-DF148021A6EB}" dt="2020-04-17T08:42:47.628" v="2500" actId="20577"/>
+        <pc:chgData name="anderssiigdreisig@gmail.com" userId="S::urn:spo:guest#anderssiigdreisig@gmail.com::" providerId="AD" clId="Web-{51EE4435-C14D-A3CC-7508-DF148021A6EB}" dt="2020-04-17T11:50:16.164" v="3553" actId="20577"/>
         <pc:sldMkLst>
           <pc:docMk/>
           <pc:sldMk cId="2012200486" sldId="259"/>
         </pc:sldMkLst>
         <pc:spChg chg="mod">
-          <ac:chgData name="anderssiigdreisig@gmail.com" userId="S::urn:spo:guest#anderssiigdreisig@gmail.com::" providerId="AD" clId="Web-{51EE4435-C14D-A3CC-7508-DF148021A6EB}" dt="2020-04-17T08:42:47.628" v="2500" actId="20577"/>
+          <ac:chgData name="anderssiigdreisig@gmail.com" userId="S::urn:spo:guest#anderssiigdreisig@gmail.com::" providerId="AD" clId="Web-{51EE4435-C14D-A3CC-7508-DF148021A6EB}" dt="2020-04-17T11:50:16.164" v="3553" actId="20577"/>
           <ac:spMkLst>
             <pc:docMk/>
             <pc:sldMk cId="2012200486" sldId="259"/>
@@ -368,17 +639,55 @@
         </pc:spChg>
       </pc:sldChg>
       <pc:sldChg chg="modSp">
-        <pc:chgData name="anderssiigdreisig@gmail.com" userId="S::urn:spo:guest#anderssiigdreisig@gmail.com::" providerId="AD" clId="Web-{51EE4435-C14D-A3CC-7508-DF148021A6EB}" dt="2020-04-17T08:41:23.480" v="2497" actId="20577"/>
+        <pc:chgData name="anderssiigdreisig@gmail.com" userId="S::urn:spo:guest#anderssiigdreisig@gmail.com::" providerId="AD" clId="Web-{51EE4435-C14D-A3CC-7508-DF148021A6EB}" dt="2020-04-17T11:54:55.116" v="3684" actId="20577"/>
         <pc:sldMkLst>
           <pc:docMk/>
           <pc:sldMk cId="1118705643" sldId="260"/>
         </pc:sldMkLst>
         <pc:spChg chg="mod">
-          <ac:chgData name="anderssiigdreisig@gmail.com" userId="S::urn:spo:guest#anderssiigdreisig@gmail.com::" providerId="AD" clId="Web-{51EE4435-C14D-A3CC-7508-DF148021A6EB}" dt="2020-04-17T08:41:23.480" v="2497" actId="20577"/>
+          <ac:chgData name="anderssiigdreisig@gmail.com" userId="S::urn:spo:guest#anderssiigdreisig@gmail.com::" providerId="AD" clId="Web-{51EE4435-C14D-A3CC-7508-DF148021A6EB}" dt="2020-04-17T11:54:55.116" v="3684" actId="20577"/>
           <ac:spMkLst>
             <pc:docMk/>
             <pc:sldMk cId="1118705643" sldId="260"/>
             <ac:spMk id="3" creationId="{F9454412-4F10-4625-BF86-F1A1ED6E3C7B}"/>
+          </ac:spMkLst>
+        </pc:spChg>
+      </pc:sldChg>
+      <pc:sldChg chg="modSp">
+        <pc:chgData name="anderssiigdreisig@gmail.com" userId="S::urn:spo:guest#anderssiigdreisig@gmail.com::" providerId="AD" clId="Web-{51EE4435-C14D-A3CC-7508-DF148021A6EB}" dt="2020-04-17T11:47:23.187" v="2978" actId="20577"/>
+        <pc:sldMkLst>
+          <pc:docMk/>
+          <pc:sldMk cId="3523726295" sldId="261"/>
+        </pc:sldMkLst>
+        <pc:spChg chg="mod">
+          <ac:chgData name="anderssiigdreisig@gmail.com" userId="S::urn:spo:guest#anderssiigdreisig@gmail.com::" providerId="AD" clId="Web-{51EE4435-C14D-A3CC-7508-DF148021A6EB}" dt="2020-04-17T11:46:27.356" v="2803" actId="20577"/>
+          <ac:spMkLst>
+            <pc:docMk/>
+            <pc:sldMk cId="3523726295" sldId="261"/>
+            <ac:spMk id="2" creationId="{8ED910BA-BF28-4119-88F5-79F3A90B0F53}"/>
+          </ac:spMkLst>
+        </pc:spChg>
+        <pc:spChg chg="mod">
+          <ac:chgData name="anderssiigdreisig@gmail.com" userId="S::urn:spo:guest#anderssiigdreisig@gmail.com::" providerId="AD" clId="Web-{51EE4435-C14D-A3CC-7508-DF148021A6EB}" dt="2020-04-17T11:47:23.187" v="2978" actId="20577"/>
+          <ac:spMkLst>
+            <pc:docMk/>
+            <pc:sldMk cId="3523726295" sldId="261"/>
+            <ac:spMk id="3" creationId="{2DE5A1ED-C76F-48E8-95F2-AC1BA42EA691}"/>
+          </ac:spMkLst>
+        </pc:spChg>
+      </pc:sldChg>
+      <pc:sldChg chg="modSp ord">
+        <pc:chgData name="anderssiigdreisig@gmail.com" userId="S::urn:spo:guest#anderssiigdreisig@gmail.com::" providerId="AD" clId="Web-{51EE4435-C14D-A3CC-7508-DF148021A6EB}" dt="2020-04-17T11:53:32.440" v="3683"/>
+        <pc:sldMkLst>
+          <pc:docMk/>
+          <pc:sldMk cId="2719062385" sldId="262"/>
+        </pc:sldMkLst>
+        <pc:spChg chg="mod">
+          <ac:chgData name="anderssiigdreisig@gmail.com" userId="S::urn:spo:guest#anderssiigdreisig@gmail.com::" providerId="AD" clId="Web-{51EE4435-C14D-A3CC-7508-DF148021A6EB}" dt="2020-04-17T11:51:13.574" v="3577" actId="20577"/>
+          <ac:spMkLst>
+            <pc:docMk/>
+            <pc:sldMk cId="2719062385" sldId="262"/>
+            <ac:spMk id="3" creationId="{3465FA9C-37A2-42A6-A989-91B76588793E}"/>
           </ac:spMkLst>
         </pc:spChg>
       </pc:sldChg>
@@ -4164,6 +4473,14 @@
   <p:clrMapOvr>
     <a:masterClrMapping/>
   </p:clrMapOvr>
+  <mc:AlternateContent xmlns:mc="http://schemas.openxmlformats.org/markup-compatibility/2006">
+    <mc:Choice xmlns:p14="http://schemas.microsoft.com/office/powerpoint/2010/main" Requires="p14">
+      <p:transition spd="slow" p14:dur="2000" advTm="1496"/>
+    </mc:Choice>
+    <mc:Fallback>
+      <p:transition spd="slow" advTm="1496"/>
+    </mc:Fallback>
+  </mc:AlternateContent>
 </p:sld>
 </file>
 
@@ -4243,7 +4560,7 @@
         </p:blipFill>
         <p:spPr>
           <a:xfrm>
-            <a:off x="6801853" y="3887679"/>
+            <a:off x="6650933" y="1934592"/>
             <a:ext cx="4962278" cy="2605196"/>
           </a:xfrm>
         </p:spPr>
@@ -4263,7 +4580,7 @@
         <p:spPr>
           <a:xfrm>
             <a:off x="878541" y="1757082"/>
-            <a:ext cx="5217458" cy="4801314"/>
+            <a:ext cx="5217458" cy="3693319"/>
           </a:xfrm>
           <a:prstGeom prst="rect">
             <a:avLst/>
@@ -4316,6 +4633,12 @@
             </a:r>
           </a:p>
           <a:p>
+            <a:pPr lvl="2"/>
+            <a:endParaRPr lang="da-DK">
+              <a:cs typeface="Calibri"/>
+            </a:endParaRPr>
+          </a:p>
+          <a:p>
             <a:pPr marL="742950" lvl="1" indent="-285750">
               <a:buFont typeface="Arial"/>
               <a:buChar char="•"/>
@@ -4324,7 +4647,7 @@
               <a:rPr lang="da-DK">
                 <a:cs typeface="Calibri"/>
               </a:rPr>
-              <a:t>Investigate how car crashes in NYC are affected by a number of variables</a:t>
+              <a:t>Investigate, visualize and predict using ML how car crashes in NYC are affected by a number of variables</a:t>
             </a:r>
           </a:p>
           <a:p>
@@ -4369,64 +4692,6 @@
               </a:rPr>
               <a:t>Car type, age and model</a:t>
             </a:r>
-          </a:p>
-          <a:p>
-            <a:pPr marL="742950" lvl="1" indent="-285750">
-              <a:buFont typeface="Arial"/>
-              <a:buChar char="•"/>
-            </a:pPr>
-            <a:r>
-              <a:rPr lang="da-DK">
-                <a:cs typeface="Calibri"/>
-              </a:rPr>
-              <a:t>Use machine learning to attempt to model the probabilities of the fatality of a crash based on</a:t>
-            </a:r>
-          </a:p>
-          <a:p>
-            <a:pPr marL="1200150" lvl="2" indent="-285750">
-              <a:buFont typeface="Arial"/>
-              <a:buChar char="•"/>
-            </a:pPr>
-            <a:r>
-              <a:rPr lang="da-DK">
-                <a:cs typeface="Calibri"/>
-              </a:rPr>
-              <a:t>Age and gender of the driver</a:t>
-            </a:r>
-          </a:p>
-          <a:p>
-            <a:pPr marL="1200150" lvl="2" indent="-285750">
-              <a:buFont typeface="Arial"/>
-              <a:buChar char="•"/>
-            </a:pPr>
-            <a:r>
-              <a:rPr lang="da-DK">
-                <a:cs typeface="Calibri"/>
-              </a:rPr>
-              <a:t>Car type, age and model</a:t>
-            </a:r>
-          </a:p>
-          <a:p>
-            <a:pPr marL="1200150" lvl="2" indent="-285750">
-              <a:buFont typeface="Arial"/>
-              <a:buChar char="•"/>
-            </a:pPr>
-            <a:r>
-              <a:rPr lang="da-DK">
-                <a:cs typeface="Calibri"/>
-              </a:rPr>
-              <a:t>Location in NYC </a:t>
-            </a:r>
-            <a:r>
-              <a:rPr lang="da-DK">
-                <a:ea typeface="+mn-lt"/>
-                <a:cs typeface="+mn-lt"/>
-              </a:rPr>
-              <a:t>and time of day </a:t>
-            </a:r>
-            <a:endParaRPr lang="da-DK">
-              <a:cs typeface="Calibri"/>
-            </a:endParaRPr>
           </a:p>
           <a:p>
             <a:pPr marL="1200150" lvl="2" indent="-285750">
@@ -4467,6 +4732,14 @@
   <p:clrMapOvr>
     <a:masterClrMapping/>
   </p:clrMapOvr>
+  <mc:AlternateContent xmlns:mc="http://schemas.openxmlformats.org/markup-compatibility/2006">
+    <mc:Choice xmlns:p14="http://schemas.microsoft.com/office/powerpoint/2010/main" Requires="p14">
+      <p:transition spd="slow" p14:dur="2000" advTm="1385"/>
+    </mc:Choice>
+    <mc:Fallback>
+      <p:transition spd="slow" advTm="1385"/>
+    </mc:Fallback>
+  </mc:AlternateContent>
 </p:sld>
 </file>
 
@@ -4503,7 +4776,12 @@
             <p:ph type="title"/>
           </p:nvPr>
         </p:nvSpPr>
-        <p:spPr/>
+        <p:spPr>
+          <a:xfrm>
+            <a:off x="838200" y="379502"/>
+            <a:ext cx="10515600" cy="1325563"/>
+          </a:xfrm>
+        </p:spPr>
         <p:txBody>
           <a:bodyPr/>
           <a:lstStyle/>
@@ -4532,7 +4810,12 @@
             <p:ph idx="1"/>
           </p:nvPr>
         </p:nvSpPr>
-        <p:spPr/>
+        <p:spPr>
+          <a:xfrm>
+            <a:off x="838200" y="1825625"/>
+            <a:ext cx="4337482" cy="4351338"/>
+          </a:xfrm>
+        </p:spPr>
         <p:txBody>
           <a:bodyPr vert="horz" lIns="91440" tIns="45720" rIns="91440" bIns="45720" rtlCol="0" anchor="t">
             <a:normAutofit/>
@@ -4540,15 +4823,15 @@
           <a:lstStyle/>
           <a:p>
             <a:r>
-              <a:rPr lang="en-GB">
+              <a:rPr lang="en-GB" sz="1400">
                 <a:cs typeface="Calibri"/>
               </a:rPr>
-              <a:t>Distributions of different car types/models plotted in an interactive Bokeh plot</a:t>
-            </a:r>
-          </a:p>
-          <a:p>
-            <a:r>
-              <a:rPr lang="en-GB">
+              <a:t>Distributions of different car types/models and their associated accidents plotted in an interactive Bokeh plot</a:t>
+            </a:r>
+          </a:p>
+          <a:p>
+            <a:r>
+              <a:rPr lang="en-GB" sz="1400">
                 <a:cs typeface="Calibri"/>
               </a:rPr>
               <a:t>Spatial distribution of fatal car crashes across NYC plotted in Folium(heatmaps with time)/Bokeh with Google Maps </a:t>
@@ -4557,32 +4840,36 @@
           <a:p>
             <a:pPr lvl="1"/>
             <a:r>
-              <a:rPr lang="en-GB">
+              <a:rPr lang="en-GB" sz="1400">
                 <a:cs typeface="Calibri"/>
               </a:rPr>
-              <a:t>Are some Boroughs in NYC more inclined to fatal crashes (dense trafic in downtown, more reckless driving in suburbs, etc.)</a:t>
-            </a:r>
-          </a:p>
-          <a:p>
-            <a:r>
-              <a:rPr lang="en-GB">
+              <a:t>Are some Boroughs in NYC more inclined to fatal crashes (dense </a:t>
+            </a:r>
+            <a:r>
+              <a:rPr lang="en-GB" sz="1400" err="1">
                 <a:cs typeface="Calibri"/>
               </a:rPr>
-              <a:t>Correlation plots between ??</a:t>
-            </a:r>
-          </a:p>
-          <a:p>
-            <a:r>
-              <a:rPr lang="en-GB">
+              <a:t>trafic</a:t>
+            </a:r>
+            <a:r>
+              <a:rPr lang="en-GB" sz="1400">
                 <a:cs typeface="Calibri"/>
               </a:rPr>
-              <a:t>Random forest classifier to predict number of fatalies, gender of the driver etc. Or classify between pedestrians or cyclists.</a:t>
+              <a:t> in downtown, more reckless driving in suburbs, etc.)</a:t>
+            </a:r>
+          </a:p>
+          <a:p>
+            <a:r>
+              <a:rPr lang="en-GB" sz="1400">
+                <a:cs typeface="Calibri"/>
+              </a:rPr>
+              <a:t>Machine learning classifier to predict number of fatalities, gender of the driver etc. Or classify between pedestrians or cyclists.</a:t>
             </a:r>
           </a:p>
           <a:p>
             <a:pPr lvl="1"/>
             <a:r>
-              <a:rPr lang="en-GB">
+              <a:rPr lang="en-GB" sz="1400">
                 <a:cs typeface="Calibri"/>
               </a:rPr>
               <a:t>Displayed in a gif across the hours of the day?</a:t>
@@ -4605,12 +4892,28 @@
   <p:clrMapOvr>
     <a:masterClrMapping/>
   </p:clrMapOvr>
+  <mc:AlternateContent xmlns:mc="http://schemas.openxmlformats.org/markup-compatibility/2006">
+    <mc:Choice xmlns:p14="http://schemas.microsoft.com/office/powerpoint/2010/main" Requires="p14">
+      <p:transition spd="slow" p14:dur="2000" advTm="1752"/>
+    </mc:Choice>
+    <mc:Fallback>
+      <p:transition spd="slow" advTm="1752"/>
+    </mc:Fallback>
+  </mc:AlternateContent>
 </p:sld>
 </file>
 
 <file path=ppt/slides/slide4.xml><?xml version="1.0" encoding="utf-8"?>
 <p:sld xmlns:a="http://schemas.openxmlformats.org/drawingml/2006/main" xmlns:r="http://schemas.openxmlformats.org/officeDocument/2006/relationships" xmlns:p="http://schemas.openxmlformats.org/presentationml/2006/main">
   <p:cSld>
+    <p:bg>
+      <p:bgPr>
+        <a:solidFill>
+          <a:schemeClr val="bg1"/>
+        </a:solidFill>
+        <a:effectLst/>
+      </p:bgPr>
+    </p:bg>
     <p:spTree>
       <p:nvGrpSpPr>
         <p:cNvPr id="1" name=""/>
@@ -4625,63 +4928,46 @@
           <a:chExt cx="0" cy="0"/>
         </a:xfrm>
       </p:grpSpPr>
-      <p:sp>
-        <p:nvSpPr>
-          <p:cNvPr id="2" name="Title 1">
-            <a:extLst>
-              <a:ext uri="{FF2B5EF4-FFF2-40B4-BE49-F238E27FC236}">
-                <a16:creationId xmlns:a16="http://schemas.microsoft.com/office/drawing/2014/main" id="{8ED910BA-BF28-4119-88F5-79F3A90B0F53}"/>
-              </a:ext>
-            </a:extLst>
-          </p:cNvPr>
-          <p:cNvSpPr>
-            <a:spLocks noGrp="1"/>
-          </p:cNvSpPr>
-          <p:nvPr>
-            <p:ph type="title"/>
-          </p:nvPr>
-        </p:nvSpPr>
-        <p:spPr/>
-        <p:txBody>
-          <a:bodyPr/>
-          <a:lstStyle/>
-          <a:p>
-            <a:endParaRPr lang="en-GB"/>
-          </a:p>
-        </p:txBody>
-      </p:sp>
-      <p:sp>
-        <p:nvSpPr>
-          <p:cNvPr id="3" name="Content Placeholder 2">
-            <a:extLst>
-              <a:ext uri="{FF2B5EF4-FFF2-40B4-BE49-F238E27FC236}">
-                <a16:creationId xmlns:a16="http://schemas.microsoft.com/office/drawing/2014/main" id="{2DE5A1ED-C76F-48E8-95F2-AC1BA42EA691}"/>
-              </a:ext>
-            </a:extLst>
-          </p:cNvPr>
-          <p:cNvSpPr>
-            <a:spLocks noGrp="1"/>
-          </p:cNvSpPr>
-          <p:nvPr>
-            <p:ph idx="1"/>
-          </p:nvPr>
-        </p:nvSpPr>
-        <p:spPr/>
-        <p:txBody>
-          <a:bodyPr/>
-          <a:lstStyle/>
-          <a:p>
-            <a:r>
-              <a:rPr lang="da-DK"/>
-              <a:t>Genre : Magazine style</a:t>
-            </a:r>
-          </a:p>
-        </p:txBody>
-      </p:sp>
+      <p:pic>
+        <p:nvPicPr>
+          <p:cNvPr id="4" name="Billede 3">
+            <a:extLst>
+              <a:ext uri="{FF2B5EF4-FFF2-40B4-BE49-F238E27FC236}">
+                <a16:creationId xmlns:a16="http://schemas.microsoft.com/office/drawing/2014/main" id="{81C80496-E692-47FC-A8CB-8477B635CFD4}"/>
+              </a:ext>
+            </a:extLst>
+          </p:cNvPr>
+          <p:cNvPicPr>
+            <a:picLocks noChangeAspect="1"/>
+          </p:cNvPicPr>
+          <p:nvPr/>
+        </p:nvPicPr>
+        <p:blipFill>
+          <a:blip r:embed="rId2">
+            <a:extLst>
+              <a:ext uri="{28A0092B-C50C-407E-A947-70E740481C1C}">
+                <a14:useLocalDpi xmlns:a14="http://schemas.microsoft.com/office/drawing/2010/main" val="0"/>
+              </a:ext>
+            </a:extLst>
+          </a:blip>
+          <a:stretch>
+            <a:fillRect/>
+          </a:stretch>
+        </p:blipFill>
+        <p:spPr>
+          <a:xfrm>
+            <a:off x="2196253" y="643466"/>
+            <a:ext cx="7799493" cy="5571067"/>
+          </a:xfrm>
+          <a:prstGeom prst="rect">
+            <a:avLst/>
+          </a:prstGeom>
+        </p:spPr>
+      </p:pic>
     </p:spTree>
     <p:extLst>
       <p:ext uri="{BB962C8B-B14F-4D97-AF65-F5344CB8AC3E}">
-        <p14:creationId xmlns:p14="http://schemas.microsoft.com/office/powerpoint/2010/main" val="3523726295"/>
+        <p14:creationId xmlns:p14="http://schemas.microsoft.com/office/powerpoint/2010/main" val="1497326156"/>
       </p:ext>
     </p:extLst>
   </p:cSld>
@@ -4713,7 +4999,7 @@
           <p:cNvPr id="2" name="Title 1">
             <a:extLst>
               <a:ext uri="{FF2B5EF4-FFF2-40B4-BE49-F238E27FC236}">
-                <a16:creationId xmlns:a16="http://schemas.microsoft.com/office/drawing/2014/main" id="{4C7B882F-9921-47D3-8495-DF07DEB60D3F}"/>
+                <a16:creationId xmlns:a16="http://schemas.microsoft.com/office/drawing/2014/main" id="{8ED910BA-BF28-4119-88F5-79F3A90B0F53}"/>
               </a:ext>
             </a:extLst>
           </p:cNvPr>
@@ -4730,8 +5016,10 @@
           <a:lstStyle/>
           <a:p>
             <a:r>
-              <a:rPr lang="da-DK"/>
-              <a:t>Implementation plan</a:t>
+              <a:rPr lang="en-GB">
+                <a:cs typeface="Calibri Light"/>
+              </a:rPr>
+              <a:t>Genre of the visualizations</a:t>
             </a:r>
             <a:endParaRPr lang="en-GB"/>
           </a:p>
@@ -4742,7 +5030,7 @@
           <p:cNvPr id="3" name="Content Placeholder 2">
             <a:extLst>
               <a:ext uri="{FF2B5EF4-FFF2-40B4-BE49-F238E27FC236}">
-                <a16:creationId xmlns:a16="http://schemas.microsoft.com/office/drawing/2014/main" id="{665EF008-76E9-4D2A-8EE2-DB24119E3945}"/>
+                <a16:creationId xmlns:a16="http://schemas.microsoft.com/office/drawing/2014/main" id="{2DE5A1ED-C76F-48E8-95F2-AC1BA42EA691}"/>
               </a:ext>
             </a:extLst>
           </p:cNvPr>
@@ -4762,31 +5050,46 @@
           <a:p>
             <a:r>
               <a:rPr lang="da-DK"/>
-              <a:t>Preliminary data analysis</a:t>
-            </a:r>
-          </a:p>
-          <a:p>
-            <a:endParaRPr lang="da-DK">
-              <a:cs typeface="Calibri"/>
-            </a:endParaRPr>
-          </a:p>
-          <a:p>
-            <a:endParaRPr lang="en-GB">
-              <a:cs typeface="Calibri" panose="020F0502020204030204"/>
-            </a:endParaRPr>
+              <a:t>Magazine style</a:t>
+            </a:r>
+          </a:p>
+          <a:p>
+            <a:pPr lvl="1"/>
+            <a:r>
+              <a:rPr lang="da-DK">
+                <a:cs typeface="Calibri"/>
+              </a:rPr>
+              <a:t>Text and plots of the interesting data viz.</a:t>
+            </a:r>
+          </a:p>
+          <a:p>
+            <a:r>
+              <a:rPr lang="da-DK">
+                <a:cs typeface="Calibri"/>
+              </a:rPr>
+              <a:t>Great for guiding the reader through such a large data set, and telling the story we want to tell.</a:t>
+            </a:r>
           </a:p>
         </p:txBody>
       </p:sp>
     </p:spTree>
     <p:extLst>
       <p:ext uri="{BB962C8B-B14F-4D97-AF65-F5344CB8AC3E}">
-        <p14:creationId xmlns:p14="http://schemas.microsoft.com/office/powerpoint/2010/main" val="2012200486"/>
+        <p14:creationId xmlns:p14="http://schemas.microsoft.com/office/powerpoint/2010/main" val="3523726295"/>
       </p:ext>
     </p:extLst>
   </p:cSld>
   <p:clrMapOvr>
     <a:masterClrMapping/>
   </p:clrMapOvr>
+  <mc:AlternateContent xmlns:mc="http://schemas.openxmlformats.org/markup-compatibility/2006">
+    <mc:Choice xmlns:p14="http://schemas.microsoft.com/office/powerpoint/2010/main" Requires="p14">
+      <p:transition spd="slow" p14:dur="2000" advTm="2675"/>
+    </mc:Choice>
+    <mc:Fallback>
+      <p:transition spd="slow" advTm="2675"/>
+    </mc:Fallback>
+  </mc:AlternateContent>
 </p:sld>
 </file>
 
@@ -4812,7 +5115,7 @@
           <p:cNvPr id="2" name="Title 1">
             <a:extLst>
               <a:ext uri="{FF2B5EF4-FFF2-40B4-BE49-F238E27FC236}">
-                <a16:creationId xmlns:a16="http://schemas.microsoft.com/office/drawing/2014/main" id="{8499280F-68D8-4B2E-B8AB-787C98B8728D}"/>
+                <a16:creationId xmlns:a16="http://schemas.microsoft.com/office/drawing/2014/main" id="{4C7B882F-9921-47D3-8495-DF07DEB60D3F}"/>
               </a:ext>
             </a:extLst>
           </p:cNvPr>
@@ -4830,7 +5133,7 @@
           <a:p>
             <a:r>
               <a:rPr lang="da-DK"/>
-              <a:t>Preliminary data-analysis</a:t>
+              <a:t>Implementation plan</a:t>
             </a:r>
             <a:endParaRPr lang="en-GB"/>
           </a:p>
@@ -4841,7 +5144,7 @@
           <p:cNvPr id="3" name="Content Placeholder 2">
             <a:extLst>
               <a:ext uri="{FF2B5EF4-FFF2-40B4-BE49-F238E27FC236}">
-                <a16:creationId xmlns:a16="http://schemas.microsoft.com/office/drawing/2014/main" id="{F9454412-4F10-4625-BF86-F1A1ED6E3C7B}"/>
+                <a16:creationId xmlns:a16="http://schemas.microsoft.com/office/drawing/2014/main" id="{665EF008-76E9-4D2A-8EE2-DB24119E3945}"/>
               </a:ext>
             </a:extLst>
           </p:cNvPr>
@@ -4860,94 +5163,207 @@
           <a:lstStyle/>
           <a:p>
             <a:r>
-              <a:rPr lang="en-GB">
+              <a:rPr lang="da-DK"/>
+              <a:t>Preliminary data </a:t>
+            </a:r>
+            <a:r>
+              <a:rPr lang="da-DK" err="1"/>
+              <a:t>analysis</a:t>
+            </a:r>
+            <a:endParaRPr lang="da-DK"/>
+          </a:p>
+          <a:p>
+            <a:r>
+              <a:rPr lang="da-DK" err="1">
                 <a:cs typeface="Calibri"/>
               </a:rPr>
-              <a:t>Size of data sets:</a:t>
-            </a:r>
-          </a:p>
-          <a:p>
-            <a:pPr lvl="1"/>
-            <a:r>
-              <a:rPr lang="en-GB">
+              <a:t>Cleaning</a:t>
+            </a:r>
+            <a:r>
+              <a:rPr lang="da-DK">
                 <a:cs typeface="Calibri"/>
               </a:rPr>
-              <a:t>Crashes: </a:t>
-            </a:r>
-          </a:p>
-          <a:p>
-            <a:pPr lvl="2"/>
-            <a:r>
-              <a:rPr lang="en-GB">
+              <a:t> the data</a:t>
+            </a:r>
+          </a:p>
+          <a:p>
+            <a:r>
+              <a:rPr lang="da-DK">
                 <a:cs typeface="Calibri"/>
               </a:rPr>
-              <a:t>X MB, 1.67M rows, 29 columns</a:t>
-            </a:r>
-          </a:p>
-          <a:p>
-            <a:pPr lvl="1"/>
-            <a:r>
-              <a:rPr lang="en-GB">
+              <a:t>Select the </a:t>
+            </a:r>
+            <a:r>
+              <a:rPr lang="da-DK" err="1">
                 <a:cs typeface="Calibri"/>
               </a:rPr>
-              <a:t>Vehicles:</a:t>
-            </a:r>
-          </a:p>
-          <a:p>
-            <a:pPr lvl="2"/>
-            <a:r>
-              <a:rPr lang="en-GB">
+              <a:t>interesting</a:t>
+            </a:r>
+            <a:r>
+              <a:rPr lang="da-DK">
                 <a:cs typeface="Calibri"/>
               </a:rPr>
-              <a:t>X MB, 3.35M rows, 25 columns </a:t>
-            </a:r>
-          </a:p>
-          <a:p>
-            <a:pPr lvl="1"/>
-            <a:r>
-              <a:rPr lang="en-GB">
+              <a:t> variables for </a:t>
+            </a:r>
+            <a:r>
+              <a:rPr lang="da-DK" err="1">
                 <a:cs typeface="Calibri"/>
               </a:rPr>
-              <a:t>Persons:</a:t>
-            </a:r>
-          </a:p>
-          <a:p>
-            <a:pPr lvl="2"/>
-            <a:r>
-              <a:rPr lang="en-GB">
+              <a:t>analysis</a:t>
+            </a:r>
+            <a:endParaRPr lang="da-DK">
+              <a:cs typeface="Calibri"/>
+            </a:endParaRPr>
+          </a:p>
+          <a:p>
+            <a:r>
+              <a:rPr lang="da-DK" err="1">
                 <a:cs typeface="Calibri"/>
               </a:rPr>
-              <a:t>X MB, 3.91 Rows, 21 columns</a:t>
-            </a:r>
-          </a:p>
-          <a:p>
-            <a:pPr lvl="2"/>
-            <a:endParaRPr lang="en-GB">
+              <a:t>Creating</a:t>
+            </a:r>
+            <a:r>
+              <a:rPr lang="da-DK">
+                <a:cs typeface="Calibri"/>
+              </a:rPr>
+              <a:t> the data </a:t>
+            </a:r>
+            <a:r>
+              <a:rPr lang="da-DK" err="1">
+                <a:cs typeface="Calibri"/>
+              </a:rPr>
+              <a:t>visualizations</a:t>
+            </a:r>
+            <a:r>
+              <a:rPr lang="da-DK">
+                <a:cs typeface="Calibri"/>
+              </a:rPr>
+              <a:t> and ML models</a:t>
+            </a:r>
+          </a:p>
+          <a:p>
+            <a:r>
+              <a:rPr lang="da-DK" err="1">
+                <a:cs typeface="Calibri"/>
+              </a:rPr>
+              <a:t>Combine</a:t>
+            </a:r>
+            <a:r>
+              <a:rPr lang="da-DK">
+                <a:cs typeface="Calibri"/>
+              </a:rPr>
+              <a:t> the </a:t>
+            </a:r>
+            <a:r>
+              <a:rPr lang="da-DK" err="1">
+                <a:cs typeface="Calibri"/>
+              </a:rPr>
+              <a:t>analysis</a:t>
+            </a:r>
+            <a:r>
+              <a:rPr lang="da-DK">
+                <a:cs typeface="Calibri"/>
+              </a:rPr>
+              <a:t> and </a:t>
+            </a:r>
+            <a:r>
+              <a:rPr lang="da-DK" err="1">
+                <a:cs typeface="Calibri"/>
+              </a:rPr>
+              <a:t>visualization</a:t>
+            </a:r>
+            <a:r>
+              <a:rPr lang="da-DK">
+                <a:cs typeface="Calibri"/>
+              </a:rPr>
+              <a:t> with a webpage</a:t>
+            </a:r>
+          </a:p>
+          <a:p>
+            <a:pPr lvl="1"/>
+            <a:r>
+              <a:rPr lang="da-DK">
+                <a:cs typeface="Calibri"/>
+              </a:rPr>
+              <a:t>The webpage </a:t>
+            </a:r>
+            <a:r>
+              <a:rPr lang="da-DK" err="1">
+                <a:cs typeface="Calibri"/>
+              </a:rPr>
+              <a:t>planned</a:t>
+            </a:r>
+            <a:r>
+              <a:rPr lang="da-DK">
+                <a:cs typeface="Calibri"/>
+              </a:rPr>
+              <a:t> for </a:t>
+            </a:r>
+            <a:r>
+              <a:rPr lang="da-DK" err="1">
+                <a:cs typeface="Calibri"/>
+              </a:rPr>
+              <a:t>now</a:t>
+            </a:r>
+            <a:r>
+              <a:rPr lang="da-DK">
+                <a:cs typeface="Calibri"/>
+              </a:rPr>
+              <a:t>, is a </a:t>
+            </a:r>
+            <a:r>
+              <a:rPr lang="da-DK" err="1">
+                <a:cs typeface="Calibri"/>
+              </a:rPr>
+              <a:t>Jupyter</a:t>
+            </a:r>
+            <a:r>
+              <a:rPr lang="da-DK">
+                <a:cs typeface="Calibri"/>
+              </a:rPr>
+              <a:t> Notebook </a:t>
+            </a:r>
+            <a:r>
+              <a:rPr lang="da-DK" err="1">
+                <a:cs typeface="Calibri"/>
+              </a:rPr>
+              <a:t>displayed</a:t>
+            </a:r>
+            <a:r>
+              <a:rPr lang="da-DK">
+                <a:cs typeface="Calibri"/>
+              </a:rPr>
+              <a:t> in </a:t>
+            </a:r>
+            <a:r>
+              <a:rPr lang="da-DK" err="1">
+                <a:cs typeface="Calibri"/>
+              </a:rPr>
+              <a:t>nbviewer</a:t>
+            </a:r>
+            <a:r>
+              <a:rPr lang="da-DK">
+                <a:cs typeface="Calibri"/>
+              </a:rPr>
+              <a:t>.</a:t>
+            </a:r>
+          </a:p>
+          <a:p>
+            <a:pPr marL="0" indent="0">
+              <a:buNone/>
+            </a:pPr>
+            <a:endParaRPr lang="da-DK">
               <a:cs typeface="Calibri"/>
             </a:endParaRPr>
           </a:p>
           <a:p>
-            <a:pPr lvl="1"/>
-            <a:r>
-              <a:rPr lang="en-GB">
-                <a:cs typeface="Calibri"/>
-              </a:rPr>
-              <a:t>Many Nans, how do we handle them</a:t>
-            </a:r>
-          </a:p>
-          <a:p>
-            <a:pPr lvl="1"/>
-            <a:r>
-              <a:rPr lang="en-GB">
-                <a:cs typeface="Calibri"/>
-              </a:rPr>
-              <a:t>Mean, variance, outliers of the given data (plot histograms of interesting continuous variables)</a:t>
-            </a:r>
-          </a:p>
-          <a:p>
-            <a:pPr lvl="1"/>
+            <a:endParaRPr lang="da-DK">
+              <a:cs typeface="Calibri"/>
+            </a:endParaRPr>
+          </a:p>
+          <a:p>
             <a:endParaRPr lang="en-GB">
-              <a:cs typeface="Calibri"/>
+              <a:cs typeface="Calibri" panose="020F0502020204030204"/>
             </a:endParaRPr>
           </a:p>
         </p:txBody>
@@ -4955,7 +5371,7 @@
     </p:spTree>
     <p:extLst>
       <p:ext uri="{BB962C8B-B14F-4D97-AF65-F5344CB8AC3E}">
-        <p14:creationId xmlns:p14="http://schemas.microsoft.com/office/powerpoint/2010/main" val="1118705643"/>
+        <p14:creationId xmlns:p14="http://schemas.microsoft.com/office/powerpoint/2010/main" val="2012200486"/>
       </p:ext>
     </p:extLst>
   </p:cSld>
@@ -4987,7 +5403,7 @@
           <p:cNvPr id="2" name="Title 1">
             <a:extLst>
               <a:ext uri="{FF2B5EF4-FFF2-40B4-BE49-F238E27FC236}">
-                <a16:creationId xmlns:a16="http://schemas.microsoft.com/office/drawing/2014/main" id="{6D1EB3EE-F3CB-464E-BD0B-CC94BB67F125}"/>
+                <a16:creationId xmlns:a16="http://schemas.microsoft.com/office/drawing/2014/main" id="{8499280F-68D8-4B2E-B8AB-787C98B8728D}"/>
               </a:ext>
             </a:extLst>
           </p:cNvPr>
@@ -5005,7 +5421,7 @@
           <a:p>
             <a:r>
               <a:rPr lang="da-DK"/>
-              <a:t>Data distribution</a:t>
+              <a:t>Preliminary data-analysis</a:t>
             </a:r>
             <a:endParaRPr lang="en-GB"/>
           </a:p>
@@ -5016,7 +5432,7 @@
           <p:cNvPr id="3" name="Content Placeholder 2">
             <a:extLst>
               <a:ext uri="{FF2B5EF4-FFF2-40B4-BE49-F238E27FC236}">
-                <a16:creationId xmlns:a16="http://schemas.microsoft.com/office/drawing/2014/main" id="{3465FA9C-37A2-42A6-A989-91B76588793E}"/>
+                <a16:creationId xmlns:a16="http://schemas.microsoft.com/office/drawing/2014/main" id="{F9454412-4F10-4625-BF86-F1A1ED6E3C7B}"/>
               </a:ext>
             </a:extLst>
           </p:cNvPr>
@@ -5025,6 +5441,224 @@
           </p:cNvSpPr>
           <p:nvPr>
             <p:ph idx="1"/>
+          </p:nvPr>
+        </p:nvSpPr>
+        <p:spPr/>
+        <p:txBody>
+          <a:bodyPr vert="horz" lIns="91440" tIns="45720" rIns="91440" bIns="45720" rtlCol="0" anchor="t">
+            <a:normAutofit fontScale="70000" lnSpcReduction="20000"/>
+          </a:bodyPr>
+          <a:lstStyle/>
+          <a:p>
+            <a:r>
+              <a:rPr lang="en-GB">
+                <a:cs typeface="Calibri"/>
+              </a:rPr>
+              <a:t>Size of data sets:</a:t>
+            </a:r>
+          </a:p>
+          <a:p>
+            <a:pPr lvl="1"/>
+            <a:r>
+              <a:rPr lang="en-GB">
+                <a:cs typeface="Calibri"/>
+              </a:rPr>
+              <a:t>Crashes: </a:t>
+            </a:r>
+          </a:p>
+          <a:p>
+            <a:pPr lvl="2"/>
+            <a:r>
+              <a:rPr lang="en-GB">
+                <a:cs typeface="Calibri"/>
+              </a:rPr>
+              <a:t>361 MB, 1.67M rows, 29 columns</a:t>
+            </a:r>
+          </a:p>
+          <a:p>
+            <a:pPr lvl="1"/>
+            <a:r>
+              <a:rPr lang="en-GB">
+                <a:cs typeface="Calibri"/>
+              </a:rPr>
+              <a:t>Vehicles:</a:t>
+            </a:r>
+          </a:p>
+          <a:p>
+            <a:pPr lvl="2"/>
+            <a:r>
+              <a:rPr lang="en-GB">
+                <a:cs typeface="Calibri"/>
+              </a:rPr>
+              <a:t>551 MB, 3.35M rows, 25 columns </a:t>
+            </a:r>
+          </a:p>
+          <a:p>
+            <a:pPr lvl="1"/>
+            <a:r>
+              <a:rPr lang="en-GB">
+                <a:cs typeface="Calibri"/>
+              </a:rPr>
+              <a:t>Persons:</a:t>
+            </a:r>
+          </a:p>
+          <a:p>
+            <a:pPr lvl="2"/>
+            <a:r>
+              <a:rPr lang="en-GB">
+                <a:cs typeface="Calibri"/>
+              </a:rPr>
+              <a:t>624MB, 3.91M Rows, 21 columns</a:t>
+            </a:r>
+          </a:p>
+          <a:p>
+            <a:pPr lvl="2"/>
+            <a:endParaRPr lang="en-GB">
+              <a:cs typeface="Calibri"/>
+            </a:endParaRPr>
+          </a:p>
+          <a:p>
+            <a:r>
+              <a:rPr lang="en-GB">
+                <a:cs typeface="Calibri"/>
+              </a:rPr>
+              <a:t>Large amount of </a:t>
+            </a:r>
+            <a:r>
+              <a:rPr lang="en-GB" err="1">
+                <a:cs typeface="Calibri"/>
+              </a:rPr>
+              <a:t>NaNs</a:t>
+            </a:r>
+            <a:endParaRPr lang="en-GB">
+              <a:cs typeface="Calibri"/>
+            </a:endParaRPr>
+          </a:p>
+          <a:p>
+            <a:pPr lvl="1"/>
+            <a:r>
+              <a:rPr lang="en-GB">
+                <a:cs typeface="Calibri"/>
+              </a:rPr>
+              <a:t>Remove unnecessary features.</a:t>
+            </a:r>
+          </a:p>
+          <a:p>
+            <a:pPr lvl="1"/>
+            <a:r>
+              <a:rPr lang="en-GB">
+                <a:cs typeface="Calibri"/>
+              </a:rPr>
+              <a:t>Enrich by API. </a:t>
+            </a:r>
+          </a:p>
+          <a:p>
+            <a:pPr lvl="1"/>
+            <a:endParaRPr lang="en-GB">
+              <a:cs typeface="Calibri"/>
+            </a:endParaRPr>
+          </a:p>
+          <a:p>
+            <a:pPr marL="457200" lvl="1" indent="0">
+              <a:buNone/>
+            </a:pPr>
+            <a:r>
+              <a:rPr lang="da-DK">
+                <a:hlinkClick r:id="rId2"/>
+              </a:rPr>
+              <a:t>https://data.cityofnewyork.us/Public-Safety/Motor-Vehicle-Collisions-Crashes/h9gi-nx95?fbclid=IwAR12fO_6_G4RuJacBXncVcQhNdLenksmEr_IrHcSGPD94PZU6w5anQjO5jo</a:t>
+            </a:r>
+            <a:endParaRPr lang="da-DK"/>
+          </a:p>
+          <a:p>
+            <a:pPr marL="457200" lvl="1" indent="0">
+              <a:buNone/>
+            </a:pPr>
+            <a:r>
+              <a:rPr lang="da-DK">
+                <a:hlinkClick r:id="rId3"/>
+              </a:rPr>
+              <a:t>https://data.cityofnewyork.us/Public-Safety/Motor-Vehicle-Collisions-Vehicles/bm4k-52h4?f</a:t>
+            </a:r>
+          </a:p>
+          <a:p>
+            <a:pPr marL="457200" lvl="1" indent="0">
+              <a:buNone/>
+            </a:pPr>
+            <a:r>
+              <a:rPr lang="da-DK" err="1">
+                <a:hlinkClick r:id="rId3"/>
+              </a:rPr>
+              <a:t>bclid</a:t>
+            </a:r>
+            <a:r>
+              <a:rPr lang="da-DK">
+                <a:hlinkClick r:id="rId3"/>
+              </a:rPr>
+              <a:t>=IwAR1MOwivYAiW2RaG1_IUxfG64CKrxXBKJMBZNGawWfYBGKSHx0PMGXRajWI</a:t>
+            </a:r>
+            <a:endParaRPr lang="da-DK"/>
+          </a:p>
+          <a:p>
+            <a:pPr marL="457200" lvl="1" indent="0">
+              <a:buNone/>
+            </a:pPr>
+            <a:r>
+              <a:rPr lang="da-DK">
+                <a:hlinkClick r:id="rId4"/>
+              </a:rPr>
+              <a:t>https://data.cityofnewyork.us/Public-Safety/Motor-Vehicle-Collisions-Person/f55k-p6yu?fbclid=IwAR3qHC60qvaCDcOJY6kb84otDnps9o4yvMMDP-17DrbPcSB3C2dQzdt9LMY</a:t>
+            </a:r>
+            <a:endParaRPr lang="en-GB">
+              <a:cs typeface="Calibri"/>
+            </a:endParaRPr>
+          </a:p>
+        </p:txBody>
+      </p:sp>
+    </p:spTree>
+    <p:extLst>
+      <p:ext uri="{BB962C8B-B14F-4D97-AF65-F5344CB8AC3E}">
+        <p14:creationId xmlns:p14="http://schemas.microsoft.com/office/powerpoint/2010/main" val="1118705643"/>
+      </p:ext>
+    </p:extLst>
+  </p:cSld>
+  <p:clrMapOvr>
+    <a:masterClrMapping/>
+  </p:clrMapOvr>
+</p:sld>
+</file>
+
+<file path=ppt/slides/slide8.xml><?xml version="1.0" encoding="utf-8"?>
+<p:sld xmlns:a="http://schemas.openxmlformats.org/drawingml/2006/main" xmlns:r="http://schemas.openxmlformats.org/officeDocument/2006/relationships" xmlns:p="http://schemas.openxmlformats.org/presentationml/2006/main">
+  <p:cSld>
+    <p:spTree>
+      <p:nvGrpSpPr>
+        <p:cNvPr id="1" name=""/>
+        <p:cNvGrpSpPr/>
+        <p:nvPr/>
+      </p:nvGrpSpPr>
+      <p:grpSpPr>
+        <a:xfrm>
+          <a:off x="0" y="0"/>
+          <a:ext cx="0" cy="0"/>
+          <a:chOff x="0" y="0"/>
+          <a:chExt cx="0" cy="0"/>
+        </a:xfrm>
+      </p:grpSpPr>
+      <p:sp>
+        <p:nvSpPr>
+          <p:cNvPr id="2" name="Title 1">
+            <a:extLst>
+              <a:ext uri="{FF2B5EF4-FFF2-40B4-BE49-F238E27FC236}">
+                <a16:creationId xmlns:a16="http://schemas.microsoft.com/office/drawing/2014/main" id="{6D1EB3EE-F3CB-464E-BD0B-CC94BB67F125}"/>
+              </a:ext>
+            </a:extLst>
+          </p:cNvPr>
+          <p:cNvSpPr>
+            <a:spLocks noGrp="1"/>
+          </p:cNvSpPr>
+          <p:nvPr>
+            <p:ph type="title"/>
           </p:nvPr>
         </p:nvSpPr>
         <p:spPr/>
@@ -5032,7 +5666,49 @@
           <a:bodyPr/>
           <a:lstStyle/>
           <a:p>
+            <a:r>
+              <a:rPr lang="da-DK"/>
+              <a:t>Data distribution</a:t>
+            </a:r>
             <a:endParaRPr lang="en-GB"/>
+          </a:p>
+        </p:txBody>
+      </p:sp>
+      <p:sp>
+        <p:nvSpPr>
+          <p:cNvPr id="3" name="Content Placeholder 2">
+            <a:extLst>
+              <a:ext uri="{FF2B5EF4-FFF2-40B4-BE49-F238E27FC236}">
+                <a16:creationId xmlns:a16="http://schemas.microsoft.com/office/drawing/2014/main" id="{3465FA9C-37A2-42A6-A989-91B76588793E}"/>
+              </a:ext>
+            </a:extLst>
+          </p:cNvPr>
+          <p:cNvSpPr>
+            <a:spLocks noGrp="1"/>
+          </p:cNvSpPr>
+          <p:nvPr>
+            <p:ph idx="1"/>
+          </p:nvPr>
+        </p:nvSpPr>
+        <p:spPr/>
+        <p:txBody>
+          <a:bodyPr vert="horz" lIns="91440" tIns="45720" rIns="91440" bIns="45720" rtlCol="0" anchor="t">
+            <a:normAutofit/>
+          </a:bodyPr>
+          <a:lstStyle/>
+          <a:p>
+            <a:r>
+              <a:rPr lang="en-GB">
+                <a:ea typeface="+mn-lt"/>
+                <a:cs typeface="+mn-lt"/>
+              </a:rPr>
+              <a:t>Mean, variance, outliers of the given data (plot histograms of interesting continuous variables)</a:t>
+            </a:r>
+          </a:p>
+          <a:p>
+            <a:endParaRPr lang="en-GB">
+              <a:cs typeface="Calibri"/>
+            </a:endParaRPr>
           </a:p>
         </p:txBody>
       </p:sp>

</xml_diff>